<commit_message>
refinements to default template
</commit_message>
<xml_diff>
--- a/pptx/pptx_template/default.pptx
+++ b/pptx/pptx_template/default.pptx
@@ -289,7 +289,7 @@
             <a:fld id="{9B72A71B-5A03-4006-A249-88022B89F593}" type="datetimeFigureOut">
               <a:rPr lang="en-GB" smtClean="0"/>
               <a:pPr/>
-              <a:t>16/07/2012</a:t>
+              <a:t>12/16/12</a:t>
             </a:fld>
             <a:endParaRPr lang="en-GB"/>
           </a:p>
@@ -456,7 +456,7 @@
             <a:fld id="{9B72A71B-5A03-4006-A249-88022B89F593}" type="datetimeFigureOut">
               <a:rPr lang="en-GB" smtClean="0"/>
               <a:pPr/>
-              <a:t>16/07/2012</a:t>
+              <a:t>12/16/12</a:t>
             </a:fld>
             <a:endParaRPr lang="en-GB"/>
           </a:p>
@@ -633,7 +633,7 @@
             <a:fld id="{9B72A71B-5A03-4006-A249-88022B89F593}" type="datetimeFigureOut">
               <a:rPr lang="en-GB" smtClean="0"/>
               <a:pPr/>
-              <a:t>16/07/2012</a:t>
+              <a:t>12/16/12</a:t>
             </a:fld>
             <a:endParaRPr lang="en-GB"/>
           </a:p>
@@ -800,7 +800,7 @@
             <a:fld id="{9B72A71B-5A03-4006-A249-88022B89F593}" type="datetimeFigureOut">
               <a:rPr lang="en-GB" smtClean="0"/>
               <a:pPr/>
-              <a:t>16/07/2012</a:t>
+              <a:t>12/16/12</a:t>
             </a:fld>
             <a:endParaRPr lang="en-GB"/>
           </a:p>
@@ -1043,7 +1043,7 @@
             <a:fld id="{9B72A71B-5A03-4006-A249-88022B89F593}" type="datetimeFigureOut">
               <a:rPr lang="en-GB" smtClean="0"/>
               <a:pPr/>
-              <a:t>16/07/2012</a:t>
+              <a:t>12/16/12</a:t>
             </a:fld>
             <a:endParaRPr lang="en-GB"/>
           </a:p>
@@ -1328,7 +1328,7 @@
             <a:fld id="{9B72A71B-5A03-4006-A249-88022B89F593}" type="datetimeFigureOut">
               <a:rPr lang="en-GB" smtClean="0"/>
               <a:pPr/>
-              <a:t>16/07/2012</a:t>
+              <a:t>12/16/12</a:t>
             </a:fld>
             <a:endParaRPr lang="en-GB"/>
           </a:p>
@@ -1747,7 +1747,7 @@
             <a:fld id="{9B72A71B-5A03-4006-A249-88022B89F593}" type="datetimeFigureOut">
               <a:rPr lang="en-GB" smtClean="0"/>
               <a:pPr/>
-              <a:t>16/07/2012</a:t>
+              <a:t>12/16/12</a:t>
             </a:fld>
             <a:endParaRPr lang="en-GB"/>
           </a:p>
@@ -1862,7 +1862,7 @@
             <a:fld id="{9B72A71B-5A03-4006-A249-88022B89F593}" type="datetimeFigureOut">
               <a:rPr lang="en-GB" smtClean="0"/>
               <a:pPr/>
-              <a:t>16/07/2012</a:t>
+              <a:t>12/16/12</a:t>
             </a:fld>
             <a:endParaRPr lang="en-GB"/>
           </a:p>
@@ -1954,7 +1954,7 @@
             <a:fld id="{9B72A71B-5A03-4006-A249-88022B89F593}" type="datetimeFigureOut">
               <a:rPr lang="en-GB" smtClean="0"/>
               <a:pPr/>
-              <a:t>16/07/2012</a:t>
+              <a:t>12/16/12</a:t>
             </a:fld>
             <a:endParaRPr lang="en-GB"/>
           </a:p>
@@ -2228,7 +2228,7 @@
             <a:fld id="{9B72A71B-5A03-4006-A249-88022B89F593}" type="datetimeFigureOut">
               <a:rPr lang="en-GB" smtClean="0"/>
               <a:pPr/>
-              <a:t>16/07/2012</a:t>
+              <a:t>12/16/12</a:t>
             </a:fld>
             <a:endParaRPr lang="en-GB"/>
           </a:p>
@@ -2478,7 +2478,7 @@
             <a:fld id="{9B72A71B-5A03-4006-A249-88022B89F593}" type="datetimeFigureOut">
               <a:rPr lang="en-GB" smtClean="0"/>
               <a:pPr/>
-              <a:t>16/07/2012</a:t>
+              <a:t>12/16/12</a:t>
             </a:fld>
             <a:endParaRPr lang="en-GB"/>
           </a:p>
@@ -2688,7 +2688,7 @@
             <a:fld id="{9B72A71B-5A03-4006-A249-88022B89F593}" type="datetimeFigureOut">
               <a:rPr lang="en-GB" smtClean="0"/>
               <a:pPr/>
-              <a:t>16/07/2012</a:t>
+              <a:t>12/16/12</a:t>
             </a:fld>
             <a:endParaRPr lang="en-GB"/>
           </a:p>
@@ -3061,33 +3061,56 @@
       </p:grpSpPr>
       <p:sp>
         <p:nvSpPr>
-          <p:cNvPr id="37" name="TextShape 1"/>
-          <p:cNvSpPr txBox="1"/>
-          <p:nvPr/>
-        </p:nvSpPr>
-        <p:spPr>
-          <a:xfrm>
-            <a:off x="0" y="332656"/>
-            <a:ext cx="9144000" cy="1262160"/>
-          </a:xfrm>
-          <a:prstGeom prst="rect">
-            <a:avLst/>
-          </a:prstGeom>
-        </p:spPr>
-        <p:txBody>
-          <a:bodyPr wrap="none" lIns="0" tIns="0" rIns="0" bIns="0" anchor="ctr"/>
-          <a:lstStyle/>
-          <a:p>
-            <a:pPr algn="ctr"/>
-            <a:r>
-              <a:rPr lang="en-GB"/>
-              <a:t>This is some text in the document</a:t>
-            </a:r>
-            <a:endParaRPr/>
+          <p:cNvPr id="2" name="Title 1"/>
+          <p:cNvSpPr>
+            <a:spLocks noGrp="1"/>
+          </p:cNvSpPr>
+          <p:nvPr>
+            <p:ph type="ctrTitle"/>
+          </p:nvPr>
+        </p:nvSpPr>
+        <p:spPr/>
+        <p:txBody>
+          <a:bodyPr/>
+          <a:lstStyle/>
+          <a:p>
+            <a:r>
+              <a:rPr lang="en-US" dirty="0" smtClean="0"/>
+              <a:t>Presentation Title Text</a:t>
+            </a:r>
+            <a:endParaRPr lang="en-US" dirty="0"/>
+          </a:p>
+        </p:txBody>
+      </p:sp>
+      <p:sp>
+        <p:nvSpPr>
+          <p:cNvPr id="3" name="Subtitle 2"/>
+          <p:cNvSpPr>
+            <a:spLocks noGrp="1"/>
+          </p:cNvSpPr>
+          <p:nvPr>
+            <p:ph type="subTitle" idx="1"/>
+          </p:nvPr>
+        </p:nvSpPr>
+        <p:spPr/>
+        <p:txBody>
+          <a:bodyPr/>
+          <a:lstStyle/>
+          <a:p>
+            <a:r>
+              <a:rPr lang="en-US" smtClean="0"/>
+              <a:t>Subtitle Text</a:t>
+            </a:r>
+            <a:endParaRPr lang="en-US"/>
           </a:p>
         </p:txBody>
       </p:sp>
     </p:spTree>
+    <p:extLst>
+      <p:ext uri="{BB962C8B-B14F-4D97-AF65-F5344CB8AC3E}">
+        <p14:creationId xmlns:p14="http://schemas.microsoft.com/office/powerpoint/2010/main" val="3561048925"/>
+      </p:ext>
+    </p:extLst>
   </p:cSld>
   <p:clrMapOvr>
     <a:masterClrMapping/>

</xml_diff>